<commit_message>
Working add feature implemented
</commit_message>
<xml_diff>
--- a/Documentation/BriefOverview.pptx
+++ b/Documentation/BriefOverview.pptx
@@ -9,6 +9,8 @@
     <p:sldId id="257" r:id="rId3"/>
     <p:sldId id="258" r:id="rId4"/>
     <p:sldId id="259" r:id="rId5"/>
+    <p:sldId id="260" r:id="rId6"/>
+    <p:sldId id="261" r:id="rId7"/>
   </p:sldIdLst>
   <p:sldSz cx="12192000" cy="6858000"/>
   <p:notesSz cx="6858000" cy="9144000"/>
@@ -311,7 +313,7 @@
             <a:fld id="{B61BEF0D-F0BB-DE4B-95CE-6DB70DBA9567}" type="datetimeFigureOut">
               <a:rPr lang="en-US" dirty="0"/>
               <a:pPr/>
-              <a:t>10/5/2017</a:t>
+              <a:t>2/20/2018</a:t>
             </a:fld>
             <a:endParaRPr lang="en-US" dirty="0"/>
           </a:p>
@@ -744,7 +746,7 @@
             <a:fld id="{B61BEF0D-F0BB-DE4B-95CE-6DB70DBA9567}" type="datetimeFigureOut">
               <a:rPr lang="en-US" dirty="0"/>
               <a:pPr/>
-              <a:t>10/5/2017</a:t>
+              <a:t>2/20/2018</a:t>
             </a:fld>
             <a:endParaRPr lang="en-US" dirty="0"/>
           </a:p>
@@ -991,7 +993,7 @@
             <a:fld id="{B61BEF0D-F0BB-DE4B-95CE-6DB70DBA9567}" type="datetimeFigureOut">
               <a:rPr lang="en-US" dirty="0"/>
               <a:pPr/>
-              <a:t>10/5/2017</a:t>
+              <a:t>2/20/2018</a:t>
             </a:fld>
             <a:endParaRPr lang="en-US" dirty="0"/>
           </a:p>
@@ -1296,7 +1298,7 @@
             <a:fld id="{B61BEF0D-F0BB-DE4B-95CE-6DB70DBA9567}" type="datetimeFigureOut">
               <a:rPr lang="en-US" dirty="0"/>
               <a:pPr/>
-              <a:t>10/5/2017</a:t>
+              <a:t>2/20/2018</a:t>
             </a:fld>
             <a:endParaRPr lang="en-US" dirty="0"/>
           </a:p>
@@ -1611,7 +1613,7 @@
             <a:fld id="{B61BEF0D-F0BB-DE4B-95CE-6DB70DBA9567}" type="datetimeFigureOut">
               <a:rPr lang="en-US" dirty="0"/>
               <a:pPr/>
-              <a:t>10/5/2017</a:t>
+              <a:t>2/20/2018</a:t>
             </a:fld>
             <a:endParaRPr lang="en-US" dirty="0"/>
           </a:p>
@@ -1910,7 +1912,7 @@
             <a:fld id="{B61BEF0D-F0BB-DE4B-95CE-6DB70DBA9567}" type="datetimeFigureOut">
               <a:rPr lang="en-US" dirty="0"/>
               <a:pPr/>
-              <a:t>10/5/2017</a:t>
+              <a:t>2/20/2018</a:t>
             </a:fld>
             <a:endParaRPr lang="en-US" dirty="0"/>
           </a:p>
@@ -2274,7 +2276,7 @@
             <a:fld id="{B61BEF0D-F0BB-DE4B-95CE-6DB70DBA9567}" type="datetimeFigureOut">
               <a:rPr lang="en-US" dirty="0"/>
               <a:pPr/>
-              <a:t>10/5/2017</a:t>
+              <a:t>2/20/2018</a:t>
             </a:fld>
             <a:endParaRPr lang="en-US" dirty="0"/>
           </a:p>
@@ -2445,7 +2447,7 @@
             <a:fld id="{B61BEF0D-F0BB-DE4B-95CE-6DB70DBA9567}" type="datetimeFigureOut">
               <a:rPr lang="en-US" dirty="0"/>
               <a:pPr/>
-              <a:t>10/5/2017</a:t>
+              <a:t>2/20/2018</a:t>
             </a:fld>
             <a:endParaRPr lang="en-US" dirty="0"/>
           </a:p>
@@ -2622,7 +2624,7 @@
             <a:fld id="{B61BEF0D-F0BB-DE4B-95CE-6DB70DBA9567}" type="datetimeFigureOut">
               <a:rPr lang="en-US" dirty="0"/>
               <a:pPr/>
-              <a:t>10/5/2017</a:t>
+              <a:t>2/20/2018</a:t>
             </a:fld>
             <a:endParaRPr lang="en-US" dirty="0"/>
           </a:p>
@@ -2789,7 +2791,7 @@
             <a:fld id="{B61BEF0D-F0BB-DE4B-95CE-6DB70DBA9567}" type="datetimeFigureOut">
               <a:rPr lang="en-US" dirty="0"/>
               <a:pPr/>
-              <a:t>10/5/2017</a:t>
+              <a:t>2/20/2018</a:t>
             </a:fld>
             <a:endParaRPr lang="en-US" dirty="0"/>
           </a:p>
@@ -3036,7 +3038,7 @@
             <a:fld id="{B61BEF0D-F0BB-DE4B-95CE-6DB70DBA9567}" type="datetimeFigureOut">
               <a:rPr lang="en-US" dirty="0"/>
               <a:pPr/>
-              <a:t>10/5/2017</a:t>
+              <a:t>2/20/2018</a:t>
             </a:fld>
             <a:endParaRPr lang="en-US" dirty="0"/>
           </a:p>
@@ -3269,7 +3271,7 @@
             <a:fld id="{B61BEF0D-F0BB-DE4B-95CE-6DB70DBA9567}" type="datetimeFigureOut">
               <a:rPr lang="en-US" dirty="0"/>
               <a:pPr/>
-              <a:t>10/5/2017</a:t>
+              <a:t>2/20/2018</a:t>
             </a:fld>
             <a:endParaRPr lang="en-US" dirty="0"/>
           </a:p>
@@ -3648,7 +3650,7 @@
             <a:fld id="{B61BEF0D-F0BB-DE4B-95CE-6DB70DBA9567}" type="datetimeFigureOut">
               <a:rPr lang="en-US" dirty="0"/>
               <a:pPr/>
-              <a:t>10/5/2017</a:t>
+              <a:t>2/20/2018</a:t>
             </a:fld>
             <a:endParaRPr lang="en-US" dirty="0"/>
           </a:p>
@@ -3763,7 +3765,7 @@
             <a:fld id="{B61BEF0D-F0BB-DE4B-95CE-6DB70DBA9567}" type="datetimeFigureOut">
               <a:rPr lang="en-US" dirty="0"/>
               <a:pPr/>
-              <a:t>10/5/2017</a:t>
+              <a:t>2/20/2018</a:t>
             </a:fld>
             <a:endParaRPr lang="en-US" dirty="0"/>
           </a:p>
@@ -3855,7 +3857,7 @@
             <a:fld id="{B61BEF0D-F0BB-DE4B-95CE-6DB70DBA9567}" type="datetimeFigureOut">
               <a:rPr lang="en-US" dirty="0"/>
               <a:pPr/>
-              <a:t>10/5/2017</a:t>
+              <a:t>2/20/2018</a:t>
             </a:fld>
             <a:endParaRPr lang="en-US" dirty="0"/>
           </a:p>
@@ -4107,7 +4109,7 @@
             <a:fld id="{B61BEF0D-F0BB-DE4B-95CE-6DB70DBA9567}" type="datetimeFigureOut">
               <a:rPr lang="en-US" dirty="0"/>
               <a:pPr/>
-              <a:t>10/5/2017</a:t>
+              <a:t>2/20/2018</a:t>
             </a:fld>
             <a:endParaRPr lang="en-US" dirty="0"/>
           </a:p>
@@ -4387,7 +4389,7 @@
             <a:fld id="{B61BEF0D-F0BB-DE4B-95CE-6DB70DBA9567}" type="datetimeFigureOut">
               <a:rPr lang="en-US" dirty="0"/>
               <a:pPr/>
-              <a:t>10/5/2017</a:t>
+              <a:t>2/20/2018</a:t>
             </a:fld>
             <a:endParaRPr lang="en-US" dirty="0"/>
           </a:p>
@@ -4790,7 +4792,7 @@
             <a:fld id="{B61BEF0D-F0BB-DE4B-95CE-6DB70DBA9567}" type="datetimeFigureOut">
               <a:rPr lang="en-US" dirty="0"/>
               <a:pPr/>
-              <a:t>10/5/2017</a:t>
+              <a:t>2/20/2018</a:t>
             </a:fld>
             <a:endParaRPr lang="en-US" dirty="0"/>
           </a:p>
@@ -5345,7 +5347,7 @@
         </p:spPr>
         <p:txBody>
           <a:bodyPr>
-            <a:normAutofit fontScale="90000"/>
+            <a:normAutofit/>
           </a:bodyPr>
           <a:lstStyle/>
           <a:p>
@@ -5356,18 +5358,7 @@
               <a:rPr lang="en-US" cap="none" dirty="0">
                 <a:latin typeface="+mn-lt"/>
               </a:rPr>
-              <a:t>Label Printer &amp;</a:t>
-            </a:r>
-            <a:br>
-              <a:rPr lang="en-US" cap="none" dirty="0">
-                <a:latin typeface="+mn-lt"/>
-              </a:rPr>
-            </a:br>
-            <a:r>
-              <a:rPr lang="en-US" cap="none" dirty="0">
-                <a:latin typeface="+mn-lt"/>
-              </a:rPr>
-              <a:t>Stock Finder</a:t>
+              <a:t>Fly Stock Program</a:t>
             </a:r>
             <a:br>
               <a:rPr lang="en-US" cap="none" dirty="0">
@@ -5535,12 +5526,21 @@
         <p:spPr>
           <a:xfrm>
             <a:off x="684212" y="1501345"/>
-            <a:ext cx="8534400" cy="3615267"/>
+            <a:ext cx="8534400" cy="4523898"/>
           </a:xfrm>
         </p:spPr>
         <p:txBody>
           <a:bodyPr/>
           <a:lstStyle/>
+          <a:p>
+            <a:pPr marL="0" indent="0">
+              <a:buNone/>
+            </a:pPr>
+            <a:r>
+              <a:rPr lang="en-US" b="1" dirty="0"/>
+              <a:t>FINDER</a:t>
+            </a:r>
+          </a:p>
           <a:p>
             <a:r>
               <a:rPr lang="en-US" dirty="0"/>
@@ -5557,6 +5557,30 @@
             <a:r>
               <a:rPr lang="en-US" dirty="0"/>
               <a:t>Print labels without having to type genotype manually</a:t>
+            </a:r>
+          </a:p>
+          <a:p>
+            <a:endParaRPr lang="en-US" dirty="0"/>
+          </a:p>
+          <a:p>
+            <a:pPr marL="0" indent="0">
+              <a:buNone/>
+            </a:pPr>
+            <a:r>
+              <a:rPr lang="en-US" b="1" dirty="0"/>
+              <a:t>ADDER</a:t>
+            </a:r>
+          </a:p>
+          <a:p>
+            <a:r>
+              <a:rPr lang="en-US" dirty="0"/>
+              <a:t>Show empty stock numbers</a:t>
+            </a:r>
+          </a:p>
+          <a:p>
+            <a:r>
+              <a:rPr lang="en-US" dirty="0"/>
+              <a:t>Add stocks from Bloomington .csv files</a:t>
             </a:r>
           </a:p>
           <a:p>
@@ -5594,79 +5618,30 @@
           <a:chExt cx="0" cy="0"/>
         </a:xfrm>
       </p:grpSpPr>
-      <p:sp>
-        <p:nvSpPr>
-          <p:cNvPr id="2" name="Title 1">
+      <p:pic>
+        <p:nvPicPr>
+          <p:cNvPr id="3" name="Picture 2">
             <a:extLst>
               <a:ext uri="{FF2B5EF4-FFF2-40B4-BE49-F238E27FC236}">
-                <a16:creationId xmlns:a16="http://schemas.microsoft.com/office/drawing/2014/main" id="{00691533-8E08-4994-9BA6-4A58B231094B}"/>
-              </a:ext>
-            </a:extLst>
-          </p:cNvPr>
-          <p:cNvSpPr>
-            <a:spLocks noGrp="1"/>
-          </p:cNvSpPr>
-          <p:nvPr>
-            <p:ph type="title"/>
-          </p:nvPr>
-        </p:nvSpPr>
-        <p:spPr>
-          <a:xfrm>
-            <a:off x="474662" y="93475"/>
-            <a:ext cx="8534400" cy="1507067"/>
-          </a:xfrm>
-        </p:spPr>
-        <p:txBody>
-          <a:bodyPr/>
-          <a:lstStyle/>
-          <a:p>
-            <a:r>
-              <a:rPr lang="en-US" dirty="0"/>
-              <a:t>Graphical user interface</a:t>
-            </a:r>
-          </a:p>
-        </p:txBody>
-      </p:sp>
-      <p:pic>
-        <p:nvPicPr>
-          <p:cNvPr id="4" name="Content Placeholder 3">
-            <a:extLst>
-              <a:ext uri="{FF2B5EF4-FFF2-40B4-BE49-F238E27FC236}">
-                <a16:creationId xmlns:a16="http://schemas.microsoft.com/office/drawing/2014/main" id="{85CAFE57-EBCF-4AD7-9F23-359A68E4DB51}"/>
+                <a16:creationId xmlns:a16="http://schemas.microsoft.com/office/drawing/2014/main" id="{B7B0F752-87D2-4042-A867-EC43FC0623B8}"/>
               </a:ext>
             </a:extLst>
           </p:cNvPr>
           <p:cNvPicPr>
-            <a:picLocks noGrp="1" noChangeAspect="1"/>
+            <a:picLocks noChangeAspect="1"/>
           </p:cNvPicPr>
-          <p:nvPr>
-            <p:ph idx="1"/>
-          </p:nvPr>
+          <p:nvPr/>
         </p:nvPicPr>
-        <p:blipFill rotWithShape="1">
-          <a:blip r:embed="rId2">
-            <a:extLst>
-              <a:ext uri="{BEBA8EAE-BF5A-486C-A8C5-ECC9F3942E4B}">
-                <a14:imgProps xmlns:a14="http://schemas.microsoft.com/office/drawing/2010/main">
-                  <a14:imgLayer r:embed="rId3">
-                    <a14:imgEffect>
-                      <a14:backgroundRemoval t="10000" b="90000" l="10000" r="92031">
-                        <a14:foregroundMark x1="91510" y1="58704" x2="90625" y2="22500"/>
-                        <a14:foregroundMark x1="92031" y1="23056" x2="92031" y2="21944"/>
-                      </a14:backgroundRemoval>
-                    </a14:imgEffect>
-                  </a14:imgLayer>
-                </a14:imgProps>
-              </a:ext>
-            </a:extLst>
-          </a:blip>
-          <a:srcRect l="63760" t="19499" r="7188" b="24989"/>
-          <a:stretch/>
+        <p:blipFill>
+          <a:blip r:embed="rId2"/>
+          <a:stretch>
+            <a:fillRect/>
+          </a:stretch>
         </p:blipFill>
         <p:spPr>
           <a:xfrm>
-            <a:off x="2697162" y="1698707"/>
-            <a:ext cx="3901277" cy="4193209"/>
+            <a:off x="2746388" y="1519818"/>
+            <a:ext cx="3843130" cy="4114800"/>
           </a:xfrm>
           <a:prstGeom prst="rect">
             <a:avLst/>
@@ -5683,6 +5658,39 @@
           </a:effectLst>
         </p:spPr>
       </p:pic>
+      <p:sp>
+        <p:nvSpPr>
+          <p:cNvPr id="2" name="Title 1">
+            <a:extLst>
+              <a:ext uri="{FF2B5EF4-FFF2-40B4-BE49-F238E27FC236}">
+                <a16:creationId xmlns:a16="http://schemas.microsoft.com/office/drawing/2014/main" id="{00691533-8E08-4994-9BA6-4A58B231094B}"/>
+              </a:ext>
+            </a:extLst>
+          </p:cNvPr>
+          <p:cNvSpPr>
+            <a:spLocks noGrp="1"/>
+          </p:cNvSpPr>
+          <p:nvPr>
+            <p:ph type="title"/>
+          </p:nvPr>
+        </p:nvSpPr>
+        <p:spPr>
+          <a:xfrm>
+            <a:off x="474662" y="93475"/>
+            <a:ext cx="8534400" cy="1507067"/>
+          </a:xfrm>
+        </p:spPr>
+        <p:txBody>
+          <a:bodyPr/>
+          <a:lstStyle/>
+          <a:p>
+            <a:r>
+              <a:rPr lang="en-US" dirty="0"/>
+              <a:t>Graphical user interface</a:t>
+            </a:r>
+          </a:p>
+        </p:txBody>
+      </p:sp>
       <p:cxnSp>
         <p:nvCxnSpPr>
           <p:cNvPr id="6" name="Straight Arrow Connector 5">
@@ -5697,7 +5705,7 @@
         </p:nvCxnSpPr>
         <p:spPr>
           <a:xfrm flipV="1">
-            <a:off x="2108200" y="2155870"/>
+            <a:off x="2108200" y="2193194"/>
             <a:ext cx="463550" cy="76201"/>
           </a:xfrm>
           <a:prstGeom prst="straightConnector1">
@@ -5736,7 +5744,7 @@
         </p:nvCxnSpPr>
         <p:spPr>
           <a:xfrm>
-            <a:off x="2165350" y="2378121"/>
+            <a:off x="2165350" y="2415445"/>
             <a:ext cx="406400" cy="0"/>
           </a:xfrm>
           <a:prstGeom prst="straightConnector1">
@@ -5777,7 +5785,7 @@
         </p:nvCxnSpPr>
         <p:spPr>
           <a:xfrm>
-            <a:off x="2108200" y="2505121"/>
+            <a:off x="2108200" y="2551776"/>
             <a:ext cx="463550" cy="120650"/>
           </a:xfrm>
           <a:prstGeom prst="straightConnector1">
@@ -5853,7 +5861,7 @@
         </p:nvCxnSpPr>
         <p:spPr>
           <a:xfrm flipH="1" flipV="1">
-            <a:off x="6647651" y="2146301"/>
+            <a:off x="6647651" y="2164963"/>
             <a:ext cx="495300" cy="38099"/>
           </a:xfrm>
           <a:prstGeom prst="straightConnector1">
@@ -5894,7 +5902,7 @@
         </p:nvCxnSpPr>
         <p:spPr>
           <a:xfrm flipH="1">
-            <a:off x="6647651" y="2368550"/>
+            <a:off x="6647651" y="2377881"/>
             <a:ext cx="495300" cy="31750"/>
           </a:xfrm>
           <a:prstGeom prst="straightConnector1">
@@ -5935,7 +5943,7 @@
         </p:nvCxnSpPr>
         <p:spPr>
           <a:xfrm flipH="1">
-            <a:off x="6647651" y="2555876"/>
+            <a:off x="6647651" y="2574538"/>
             <a:ext cx="495300" cy="60325"/>
           </a:xfrm>
           <a:prstGeom prst="straightConnector1">
@@ -6011,7 +6019,7 @@
         </p:nvCxnSpPr>
         <p:spPr>
           <a:xfrm flipH="1">
-            <a:off x="6610350" y="4115737"/>
+            <a:off x="6619681" y="4003765"/>
             <a:ext cx="495300" cy="0"/>
           </a:xfrm>
           <a:prstGeom prst="straightConnector1">
@@ -6050,7 +6058,7 @@
         </p:nvSpPr>
         <p:spPr>
           <a:xfrm>
-            <a:off x="7130251" y="3730188"/>
+            <a:off x="7130251" y="3720857"/>
             <a:ext cx="1619250" cy="646331"/>
           </a:xfrm>
           <a:prstGeom prst="rect">
@@ -6296,12 +6304,47 @@
           </a:p>
         </p:txBody>
       </p:sp>
+      <p:sp>
+        <p:nvSpPr>
+          <p:cNvPr id="9" name="TextBox 8">
+            <a:extLst>
+              <a:ext uri="{FF2B5EF4-FFF2-40B4-BE49-F238E27FC236}">
+                <a16:creationId xmlns:a16="http://schemas.microsoft.com/office/drawing/2014/main" id="{D62C273F-656A-49B8-9D58-6AB1231A42B4}"/>
+              </a:ext>
+            </a:extLst>
+          </p:cNvPr>
+          <p:cNvSpPr txBox="1"/>
+          <p:nvPr/>
+        </p:nvSpPr>
+        <p:spPr>
+          <a:xfrm>
+            <a:off x="757484" y="5712865"/>
+            <a:ext cx="4460682" cy="646331"/>
+          </a:xfrm>
+          <a:prstGeom prst="rect">
+            <a:avLst/>
+          </a:prstGeom>
+          <a:noFill/>
+        </p:spPr>
+        <p:txBody>
+          <a:bodyPr wrap="square" rtlCol="0">
+            <a:spAutoFit/>
+          </a:bodyPr>
+          <a:lstStyle/>
+          <a:p>
+            <a:r>
+              <a:rPr lang="en-US" dirty="0"/>
+              <a:t>Example: “Lei” was searched under the “Responsible Person” entry</a:t>
+            </a:r>
+          </a:p>
+        </p:txBody>
+      </p:sp>
       <p:pic>
         <p:nvPicPr>
-          <p:cNvPr id="8" name="Picture 7">
+          <p:cNvPr id="3" name="Picture 2">
             <a:extLst>
               <a:ext uri="{FF2B5EF4-FFF2-40B4-BE49-F238E27FC236}">
-                <a16:creationId xmlns:a16="http://schemas.microsoft.com/office/drawing/2014/main" id="{A9EFB34F-E691-4BFA-A8F5-1EBC84011981}"/>
+                <a16:creationId xmlns:a16="http://schemas.microsoft.com/office/drawing/2014/main" id="{B1E68468-7840-458E-B9D5-68B37715261E}"/>
               </a:ext>
             </a:extLst>
           </p:cNvPr>
@@ -6310,34 +6353,16 @@
           </p:cNvPicPr>
           <p:nvPr/>
         </p:nvPicPr>
-        <p:blipFill rotWithShape="1">
-          <a:blip r:embed="rId2">
-            <a:extLst>
-              <a:ext uri="{BEBA8EAE-BF5A-486C-A8C5-ECC9F3942E4B}">
-                <a14:imgProps xmlns:a14="http://schemas.microsoft.com/office/drawing/2010/main">
-                  <a14:imgLayer r:embed="rId3">
-                    <a14:imgEffect>
-                      <a14:backgroundRemoval t="42963" b="84815" l="61458" r="93594">
-                        <a14:foregroundMark x1="61510" y1="42963" x2="61747" y2="81045"/>
-                        <a14:foregroundMark x1="93594" y1="80370" x2="93438" y2="43704"/>
-                        <a14:backgroundMark x1="61823" y1="83148" x2="61510" y2="85926"/>
-                        <a14:backgroundMark x1="61823" y1="82870" x2="62083" y2="82593"/>
-                        <a14:backgroundMark x1="62083" y1="82685" x2="61198" y2="82407"/>
-                        <a14:backgroundMark x1="62396" y1="82500" x2="61667" y2="82222"/>
-                      </a14:backgroundRemoval>
-                    </a14:imgEffect>
-                  </a14:imgLayer>
-                </a14:imgProps>
-              </a:ext>
-            </a:extLst>
-          </a:blip>
-          <a:srcRect l="60469" t="39907" r="4687" b="17500"/>
-          <a:stretch/>
+        <p:blipFill>
+          <a:blip r:embed="rId2"/>
+          <a:stretch>
+            <a:fillRect/>
+          </a:stretch>
         </p:blipFill>
         <p:spPr>
           <a:xfrm>
-            <a:off x="757484" y="2596800"/>
-            <a:ext cx="4248150" cy="2920999"/>
+            <a:off x="357964" y="2661858"/>
+            <a:ext cx="4711391" cy="2556745"/>
           </a:xfrm>
           <a:prstGeom prst="rect">
             <a:avLst/>
@@ -6354,12 +6379,115 @@
           </a:effectLst>
         </p:spPr>
       </p:pic>
-      <p:sp>
-        <p:nvSpPr>
-          <p:cNvPr id="9" name="TextBox 8">
+    </p:spTree>
+    <p:extLst>
+      <p:ext uri="{BB962C8B-B14F-4D97-AF65-F5344CB8AC3E}">
+        <p14:creationId xmlns:p14="http://schemas.microsoft.com/office/powerpoint/2010/main" val="2872690431"/>
+      </p:ext>
+    </p:extLst>
+  </p:cSld>
+  <p:clrMapOvr>
+    <a:masterClrMapping/>
+  </p:clrMapOvr>
+</p:sld>
+</file>
+
+<file path=ppt/slides/slide5.xml><?xml version="1.0" encoding="utf-8"?>
+<p:sld xmlns:a="http://schemas.openxmlformats.org/drawingml/2006/main" xmlns:r="http://schemas.openxmlformats.org/officeDocument/2006/relationships" xmlns:p="http://schemas.openxmlformats.org/presentationml/2006/main">
+  <p:cSld>
+    <p:spTree>
+      <p:nvGrpSpPr>
+        <p:cNvPr id="1" name=""/>
+        <p:cNvGrpSpPr/>
+        <p:nvPr/>
+      </p:nvGrpSpPr>
+      <p:grpSpPr>
+        <a:xfrm>
+          <a:off x="0" y="0"/>
+          <a:ext cx="0" cy="0"/>
+          <a:chOff x="0" y="0"/>
+          <a:chExt cx="0" cy="0"/>
+        </a:xfrm>
+      </p:grpSpPr>
+      <p:sp>
+        <p:nvSpPr>
+          <p:cNvPr id="2" name="Title 1">
             <a:extLst>
               <a:ext uri="{FF2B5EF4-FFF2-40B4-BE49-F238E27FC236}">
-                <a16:creationId xmlns:a16="http://schemas.microsoft.com/office/drawing/2014/main" id="{D62C273F-656A-49B8-9D58-6AB1231A42B4}"/>
+                <a16:creationId xmlns:a16="http://schemas.microsoft.com/office/drawing/2014/main" id="{2D6F915C-9AB3-4CEC-9A5A-43C979A481D2}"/>
+              </a:ext>
+            </a:extLst>
+          </p:cNvPr>
+          <p:cNvSpPr>
+            <a:spLocks noGrp="1"/>
+          </p:cNvSpPr>
+          <p:nvPr>
+            <p:ph type="title"/>
+          </p:nvPr>
+        </p:nvSpPr>
+        <p:spPr>
+          <a:xfrm>
+            <a:off x="175153" y="-224626"/>
+            <a:ext cx="8534400" cy="1507067"/>
+          </a:xfrm>
+        </p:spPr>
+        <p:txBody>
+          <a:bodyPr/>
+          <a:lstStyle/>
+          <a:p>
+            <a:r>
+              <a:rPr lang="en-US" dirty="0"/>
+              <a:t>Add Stock</a:t>
+            </a:r>
+          </a:p>
+        </p:txBody>
+      </p:sp>
+      <p:pic>
+        <p:nvPicPr>
+          <p:cNvPr id="4" name="Picture 3">
+            <a:extLst>
+              <a:ext uri="{FF2B5EF4-FFF2-40B4-BE49-F238E27FC236}">
+                <a16:creationId xmlns:a16="http://schemas.microsoft.com/office/drawing/2014/main" id="{411232F2-C353-4C53-B45A-7ACCA1F5008C}"/>
+              </a:ext>
+            </a:extLst>
+          </p:cNvPr>
+          <p:cNvPicPr>
+            <a:picLocks noChangeAspect="1"/>
+          </p:cNvPicPr>
+          <p:nvPr/>
+        </p:nvPicPr>
+        <p:blipFill>
+          <a:blip r:embed="rId2"/>
+          <a:stretch>
+            <a:fillRect/>
+          </a:stretch>
+        </p:blipFill>
+        <p:spPr>
+          <a:xfrm>
+            <a:off x="117422" y="914397"/>
+            <a:ext cx="3821071" cy="4091181"/>
+          </a:xfrm>
+          <a:prstGeom prst="rect">
+            <a:avLst/>
+          </a:prstGeom>
+          <a:ln>
+            <a:noFill/>
+          </a:ln>
+          <a:effectLst>
+            <a:outerShdw blurRad="292100" dist="139700" dir="2700000" algn="tl" rotWithShape="0">
+              <a:srgbClr val="333333">
+                <a:alpha val="65000"/>
+              </a:srgbClr>
+            </a:outerShdw>
+          </a:effectLst>
+        </p:spPr>
+      </p:pic>
+      <p:sp>
+        <p:nvSpPr>
+          <p:cNvPr id="5" name="TextBox 4">
+            <a:extLst>
+              <a:ext uri="{FF2B5EF4-FFF2-40B4-BE49-F238E27FC236}">
+                <a16:creationId xmlns:a16="http://schemas.microsoft.com/office/drawing/2014/main" id="{9B31C107-B0DC-4837-B044-D1AAE80C2187}"/>
               </a:ext>
             </a:extLst>
           </p:cNvPr>
@@ -6368,8 +6496,8 @@
         </p:nvSpPr>
         <p:spPr>
           <a:xfrm>
-            <a:off x="757484" y="5712865"/>
-            <a:ext cx="4460682" cy="646331"/>
+            <a:off x="4148974" y="1004711"/>
+            <a:ext cx="7644919" cy="2308324"/>
           </a:xfrm>
           <a:prstGeom prst="rect">
             <a:avLst/>
@@ -6382,17 +6510,305 @@
           </a:bodyPr>
           <a:lstStyle/>
           <a:p>
-            <a:r>
-              <a:rPr lang="en-US" dirty="0"/>
-              <a:t>Example: “Lei Zhou” was searched under the “Responsible Person” entry</a:t>
-            </a:r>
-          </a:p>
-        </p:txBody>
-      </p:sp>
+            <a:pPr marL="285750" indent="-285750">
+              <a:buFont typeface="Wingdings" panose="05000000000000000000" pitchFamily="2" charset="2"/>
+              <a:buChar char="§"/>
+            </a:pPr>
+            <a:r>
+              <a:rPr lang="en-US" dirty="0">
+                <a:solidFill>
+                  <a:schemeClr val="bg2">
+                    <a:lumMod val="50000"/>
+                  </a:schemeClr>
+                </a:solidFill>
+              </a:rPr>
+              <a:t>Enter Bloomington .csv file location in the textbox, then press ‘Add Stock’ to add Bloomington stocks</a:t>
+            </a:r>
+          </a:p>
+          <a:p>
+            <a:pPr marL="285750" indent="-285750">
+              <a:buFont typeface="Wingdings" panose="05000000000000000000" pitchFamily="2" charset="2"/>
+              <a:buChar char="§"/>
+            </a:pPr>
+            <a:endParaRPr lang="en-US" dirty="0">
+              <a:solidFill>
+                <a:schemeClr val="bg2">
+                  <a:lumMod val="50000"/>
+                </a:schemeClr>
+              </a:solidFill>
+            </a:endParaRPr>
+          </a:p>
+          <a:p>
+            <a:pPr marL="285750" indent="-285750">
+              <a:buFont typeface="Wingdings" panose="05000000000000000000" pitchFamily="2" charset="2"/>
+              <a:buChar char="§"/>
+            </a:pPr>
+            <a:r>
+              <a:rPr lang="en-US" dirty="0">
+                <a:solidFill>
+                  <a:schemeClr val="bg2">
+                    <a:lumMod val="50000"/>
+                  </a:schemeClr>
+                </a:solidFill>
+              </a:rPr>
+              <a:t>Display unused stock numbers simply displays numbers that are currently unused (shown below)</a:t>
+            </a:r>
+          </a:p>
+          <a:p>
+            <a:pPr marL="285750" indent="-285750">
+              <a:buFont typeface="Wingdings" panose="05000000000000000000" pitchFamily="2" charset="2"/>
+              <a:buChar char="§"/>
+            </a:pPr>
+            <a:endParaRPr lang="en-US" dirty="0">
+              <a:solidFill>
+                <a:schemeClr val="bg2">
+                  <a:lumMod val="50000"/>
+                </a:schemeClr>
+              </a:solidFill>
+            </a:endParaRPr>
+          </a:p>
+          <a:p>
+            <a:pPr marL="285750" indent="-285750">
+              <a:buFont typeface="Wingdings" panose="05000000000000000000" pitchFamily="2" charset="2"/>
+              <a:buChar char="§"/>
+            </a:pPr>
+            <a:r>
+              <a:rPr lang="en-US" dirty="0">
+                <a:solidFill>
+                  <a:schemeClr val="bg2">
+                    <a:lumMod val="50000"/>
+                  </a:schemeClr>
+                </a:solidFill>
+              </a:rPr>
+              <a:t>Write to Dropbox currently does nothing (for safety purposes).</a:t>
+            </a:r>
+          </a:p>
+          <a:p>
+            <a:pPr marL="285750" indent="-285750">
+              <a:buFont typeface="Wingdings" panose="05000000000000000000" pitchFamily="2" charset="2"/>
+              <a:buChar char="§"/>
+            </a:pPr>
+            <a:endParaRPr lang="en-US" dirty="0"/>
+          </a:p>
+        </p:txBody>
+      </p:sp>
+      <p:pic>
+        <p:nvPicPr>
+          <p:cNvPr id="6" name="Picture 5">
+            <a:extLst>
+              <a:ext uri="{FF2B5EF4-FFF2-40B4-BE49-F238E27FC236}">
+                <a16:creationId xmlns:a16="http://schemas.microsoft.com/office/drawing/2014/main" id="{7733CD80-9FBD-4576-B831-3A180F9C7832}"/>
+              </a:ext>
+            </a:extLst>
+          </p:cNvPr>
+          <p:cNvPicPr>
+            <a:picLocks noChangeAspect="1"/>
+          </p:cNvPicPr>
+          <p:nvPr/>
+        </p:nvPicPr>
+        <p:blipFill>
+          <a:blip r:embed="rId3"/>
+          <a:stretch>
+            <a:fillRect/>
+          </a:stretch>
+        </p:blipFill>
+        <p:spPr>
+          <a:xfrm>
+            <a:off x="4540858" y="3020656"/>
+            <a:ext cx="2884268" cy="3667893"/>
+          </a:xfrm>
+          <a:prstGeom prst="rect">
+            <a:avLst/>
+          </a:prstGeom>
+          <a:ln>
+            <a:noFill/>
+          </a:ln>
+          <a:effectLst>
+            <a:outerShdw blurRad="292100" dist="139700" dir="2700000" algn="tl" rotWithShape="0">
+              <a:srgbClr val="333333">
+                <a:alpha val="65000"/>
+              </a:srgbClr>
+            </a:outerShdw>
+          </a:effectLst>
+        </p:spPr>
+      </p:pic>
     </p:spTree>
     <p:extLst>
       <p:ext uri="{BB962C8B-B14F-4D97-AF65-F5344CB8AC3E}">
-        <p14:creationId xmlns:p14="http://schemas.microsoft.com/office/powerpoint/2010/main" val="2872690431"/>
+        <p14:creationId xmlns:p14="http://schemas.microsoft.com/office/powerpoint/2010/main" val="4160394045"/>
+      </p:ext>
+    </p:extLst>
+  </p:cSld>
+  <p:clrMapOvr>
+    <a:masterClrMapping/>
+  </p:clrMapOvr>
+</p:sld>
+</file>
+
+<file path=ppt/slides/slide6.xml><?xml version="1.0" encoding="utf-8"?>
+<p:sld xmlns:a="http://schemas.openxmlformats.org/drawingml/2006/main" xmlns:r="http://schemas.openxmlformats.org/officeDocument/2006/relationships" xmlns:p="http://schemas.openxmlformats.org/presentationml/2006/main">
+  <p:cSld>
+    <p:spTree>
+      <p:nvGrpSpPr>
+        <p:cNvPr id="1" name=""/>
+        <p:cNvGrpSpPr/>
+        <p:nvPr/>
+      </p:nvGrpSpPr>
+      <p:grpSpPr>
+        <a:xfrm>
+          <a:off x="0" y="0"/>
+          <a:ext cx="0" cy="0"/>
+          <a:chOff x="0" y="0"/>
+          <a:chExt cx="0" cy="0"/>
+        </a:xfrm>
+      </p:grpSpPr>
+      <p:sp>
+        <p:nvSpPr>
+          <p:cNvPr id="2" name="Title 1">
+            <a:extLst>
+              <a:ext uri="{FF2B5EF4-FFF2-40B4-BE49-F238E27FC236}">
+                <a16:creationId xmlns:a16="http://schemas.microsoft.com/office/drawing/2014/main" id="{828EDC85-6B01-4402-A35E-4A567D49844B}"/>
+              </a:ext>
+            </a:extLst>
+          </p:cNvPr>
+          <p:cNvSpPr>
+            <a:spLocks noGrp="1"/>
+          </p:cNvSpPr>
+          <p:nvPr>
+            <p:ph type="title"/>
+          </p:nvPr>
+        </p:nvSpPr>
+        <p:spPr>
+          <a:xfrm>
+            <a:off x="366971" y="512491"/>
+            <a:ext cx="8534400" cy="1507067"/>
+          </a:xfrm>
+        </p:spPr>
+        <p:txBody>
+          <a:bodyPr/>
+          <a:lstStyle/>
+          <a:p>
+            <a:r>
+              <a:rPr lang="en-US" dirty="0"/>
+              <a:t>ADD STOCK (Continued)</a:t>
+            </a:r>
+          </a:p>
+        </p:txBody>
+      </p:sp>
+      <p:sp>
+        <p:nvSpPr>
+          <p:cNvPr id="3" name="Content Placeholder 2">
+            <a:extLst>
+              <a:ext uri="{FF2B5EF4-FFF2-40B4-BE49-F238E27FC236}">
+                <a16:creationId xmlns:a16="http://schemas.microsoft.com/office/drawing/2014/main" id="{DFC55C11-69CC-4D6C-9C10-DCB62A2DF86F}"/>
+              </a:ext>
+            </a:extLst>
+          </p:cNvPr>
+          <p:cNvSpPr>
+            <a:spLocks noGrp="1"/>
+          </p:cNvSpPr>
+          <p:nvPr>
+            <p:ph idx="1"/>
+          </p:nvPr>
+        </p:nvSpPr>
+        <p:spPr>
+          <a:xfrm>
+            <a:off x="5598367" y="2033467"/>
+            <a:ext cx="6438089" cy="3615267"/>
+          </a:xfrm>
+        </p:spPr>
+        <p:txBody>
+          <a:bodyPr>
+            <a:normAutofit fontScale="85000" lnSpcReduction="10000"/>
+          </a:bodyPr>
+          <a:lstStyle/>
+          <a:p>
+            <a:r>
+              <a:rPr lang="en-US" dirty="0"/>
+              <a:t>All Bloomington stock will be displayed.</a:t>
+            </a:r>
+          </a:p>
+          <a:p>
+            <a:r>
+              <a:rPr lang="en-US" dirty="0"/>
+              <a:t>Select which ones you want added (all of them by default)</a:t>
+            </a:r>
+          </a:p>
+          <a:p>
+            <a:r>
+              <a:rPr lang="en-US" dirty="0"/>
+              <a:t>Use the Match buttons to automatically assign the stocks to the first empty position.</a:t>
+            </a:r>
+          </a:p>
+          <a:p>
+            <a:r>
+              <a:rPr lang="en-US" dirty="0"/>
+              <a:t>Once all stocks have been assigned a stock number (Note: Make sure you have not entered an existing stock number), press the ‘Add Selected…’ button</a:t>
+            </a:r>
+          </a:p>
+          <a:p>
+            <a:r>
+              <a:rPr lang="en-US" dirty="0"/>
+              <a:t>Display unused stock numbers is displayed for convenience</a:t>
+            </a:r>
+          </a:p>
+          <a:p>
+            <a:r>
+              <a:rPr lang="en-US" dirty="0"/>
+              <a:t>Stocks are currently added to …/Resources/</a:t>
+            </a:r>
+            <a:r>
+              <a:rPr lang="en-US"/>
+              <a:t>Lab.odb</a:t>
+            </a:r>
+            <a:endParaRPr lang="en-US" dirty="0"/>
+          </a:p>
+        </p:txBody>
+      </p:sp>
+      <p:pic>
+        <p:nvPicPr>
+          <p:cNvPr id="4" name="Picture 3">
+            <a:extLst>
+              <a:ext uri="{FF2B5EF4-FFF2-40B4-BE49-F238E27FC236}">
+                <a16:creationId xmlns:a16="http://schemas.microsoft.com/office/drawing/2014/main" id="{D261BEF4-A689-4367-811F-43CBD947F53A}"/>
+              </a:ext>
+            </a:extLst>
+          </p:cNvPr>
+          <p:cNvPicPr>
+            <a:picLocks noChangeAspect="1"/>
+          </p:cNvPicPr>
+          <p:nvPr/>
+        </p:nvPicPr>
+        <p:blipFill>
+          <a:blip r:embed="rId2"/>
+          <a:stretch>
+            <a:fillRect/>
+          </a:stretch>
+        </p:blipFill>
+        <p:spPr>
+          <a:xfrm>
+            <a:off x="366971" y="1951070"/>
+            <a:ext cx="4926197" cy="3889893"/>
+          </a:xfrm>
+          <a:prstGeom prst="rect">
+            <a:avLst/>
+          </a:prstGeom>
+          <a:ln>
+            <a:noFill/>
+          </a:ln>
+          <a:effectLst>
+            <a:outerShdw blurRad="292100" dist="139700" dir="2700000" algn="tl" rotWithShape="0">
+              <a:srgbClr val="333333">
+                <a:alpha val="65000"/>
+              </a:srgbClr>
+            </a:outerShdw>
+          </a:effectLst>
+        </p:spPr>
+      </p:pic>
+    </p:spTree>
+    <p:extLst>
+      <p:ext uri="{BB962C8B-B14F-4D97-AF65-F5344CB8AC3E}">
+        <p14:creationId xmlns:p14="http://schemas.microsoft.com/office/powerpoint/2010/main" val="183325171"/>
       </p:ext>
     </p:extLst>
   </p:cSld>

</xml_diff>